<commit_message>
trying to merge meshes for one collider
</commit_message>
<xml_diff>
--- a/DevBlog.pptx
+++ b/DevBlog.pptx
@@ -7,6 +7,7 @@
   <p:sldIdLst>
     <p:sldId id="256" r:id="rId2"/>
     <p:sldId id="257" r:id="rId3"/>
+    <p:sldId id="258" r:id="rId4"/>
   </p:sldIdLst>
   <p:sldSz cx="12192000" cy="6858000"/>
   <p:notesSz cx="6858000" cy="9144000"/>
@@ -105,6 +106,11 @@
       </a:defRPr>
     </a:lvl9pPr>
   </p:defaultTextStyle>
+  <p:extLst>
+    <p:ext uri="{EFAFB233-063F-42B5-8137-9DF3F51BA10A}">
+      <p15:sldGuideLst xmlns:p15="http://schemas.microsoft.com/office/powerpoint/2012/main"/>
+    </p:ext>
+  </p:extLst>
 </p:presentation>
 </file>
 
@@ -257,7 +263,7 @@
           <a:p>
             <a:fld id="{15572733-4D19-4DF4-9EBA-D8DF8FE67AD9}" type="datetimeFigureOut">
               <a:rPr lang="en-GB" smtClean="0"/>
-              <a:t>09/11/2024</a:t>
+              <a:t>11/11/2024</a:t>
             </a:fld>
             <a:endParaRPr lang="en-GB"/>
           </a:p>
@@ -457,7 +463,7 @@
           <a:p>
             <a:fld id="{15572733-4D19-4DF4-9EBA-D8DF8FE67AD9}" type="datetimeFigureOut">
               <a:rPr lang="en-GB" smtClean="0"/>
-              <a:t>09/11/2024</a:t>
+              <a:t>11/11/2024</a:t>
             </a:fld>
             <a:endParaRPr lang="en-GB"/>
           </a:p>
@@ -667,7 +673,7 @@
           <a:p>
             <a:fld id="{15572733-4D19-4DF4-9EBA-D8DF8FE67AD9}" type="datetimeFigureOut">
               <a:rPr lang="en-GB" smtClean="0"/>
-              <a:t>09/11/2024</a:t>
+              <a:t>11/11/2024</a:t>
             </a:fld>
             <a:endParaRPr lang="en-GB"/>
           </a:p>
@@ -867,7 +873,7 @@
           <a:p>
             <a:fld id="{15572733-4D19-4DF4-9EBA-D8DF8FE67AD9}" type="datetimeFigureOut">
               <a:rPr lang="en-GB" smtClean="0"/>
-              <a:t>09/11/2024</a:t>
+              <a:t>11/11/2024</a:t>
             </a:fld>
             <a:endParaRPr lang="en-GB"/>
           </a:p>
@@ -1143,7 +1149,7 @@
           <a:p>
             <a:fld id="{15572733-4D19-4DF4-9EBA-D8DF8FE67AD9}" type="datetimeFigureOut">
               <a:rPr lang="en-GB" smtClean="0"/>
-              <a:t>09/11/2024</a:t>
+              <a:t>11/11/2024</a:t>
             </a:fld>
             <a:endParaRPr lang="en-GB"/>
           </a:p>
@@ -1411,7 +1417,7 @@
           <a:p>
             <a:fld id="{15572733-4D19-4DF4-9EBA-D8DF8FE67AD9}" type="datetimeFigureOut">
               <a:rPr lang="en-GB" smtClean="0"/>
-              <a:t>09/11/2024</a:t>
+              <a:t>11/11/2024</a:t>
             </a:fld>
             <a:endParaRPr lang="en-GB"/>
           </a:p>
@@ -1826,7 +1832,7 @@
           <a:p>
             <a:fld id="{15572733-4D19-4DF4-9EBA-D8DF8FE67AD9}" type="datetimeFigureOut">
               <a:rPr lang="en-GB" smtClean="0"/>
-              <a:t>09/11/2024</a:t>
+              <a:t>11/11/2024</a:t>
             </a:fld>
             <a:endParaRPr lang="en-GB"/>
           </a:p>
@@ -1968,7 +1974,7 @@
           <a:p>
             <a:fld id="{15572733-4D19-4DF4-9EBA-D8DF8FE67AD9}" type="datetimeFigureOut">
               <a:rPr lang="en-GB" smtClean="0"/>
-              <a:t>09/11/2024</a:t>
+              <a:t>11/11/2024</a:t>
             </a:fld>
             <a:endParaRPr lang="en-GB"/>
           </a:p>
@@ -2081,7 +2087,7 @@
           <a:p>
             <a:fld id="{15572733-4D19-4DF4-9EBA-D8DF8FE67AD9}" type="datetimeFigureOut">
               <a:rPr lang="en-GB" smtClean="0"/>
-              <a:t>09/11/2024</a:t>
+              <a:t>11/11/2024</a:t>
             </a:fld>
             <a:endParaRPr lang="en-GB"/>
           </a:p>
@@ -2394,7 +2400,7 @@
           <a:p>
             <a:fld id="{15572733-4D19-4DF4-9EBA-D8DF8FE67AD9}" type="datetimeFigureOut">
               <a:rPr lang="en-GB" smtClean="0"/>
-              <a:t>09/11/2024</a:t>
+              <a:t>11/11/2024</a:t>
             </a:fld>
             <a:endParaRPr lang="en-GB"/>
           </a:p>
@@ -2683,7 +2689,7 @@
           <a:p>
             <a:fld id="{15572733-4D19-4DF4-9EBA-D8DF8FE67AD9}" type="datetimeFigureOut">
               <a:rPr lang="en-GB" smtClean="0"/>
-              <a:t>09/11/2024</a:t>
+              <a:t>11/11/2024</a:t>
             </a:fld>
             <a:endParaRPr lang="en-GB"/>
           </a:p>
@@ -2926,7 +2932,7 @@
           <a:p>
             <a:fld id="{15572733-4D19-4DF4-9EBA-D8DF8FE67AD9}" type="datetimeFigureOut">
               <a:rPr lang="en-GB" smtClean="0"/>
-              <a:t>09/11/2024</a:t>
+              <a:t>11/11/2024</a:t>
             </a:fld>
             <a:endParaRPr lang="en-GB"/>
           </a:p>
@@ -3596,6 +3602,130 @@
     <p:extLst>
       <p:ext uri="{BB962C8B-B14F-4D97-AF65-F5344CB8AC3E}">
         <p14:creationId xmlns:p14="http://schemas.microsoft.com/office/powerpoint/2010/main" val="470313228"/>
+      </p:ext>
+    </p:extLst>
+  </p:cSld>
+  <p:clrMapOvr>
+    <a:masterClrMapping/>
+  </p:clrMapOvr>
+</p:sld>
+</file>
+
+<file path=ppt/slides/slide3.xml><?xml version="1.0" encoding="utf-8"?>
+<p:sld xmlns:a="http://schemas.openxmlformats.org/drawingml/2006/main" xmlns:r="http://schemas.openxmlformats.org/officeDocument/2006/relationships" xmlns:p="http://schemas.openxmlformats.org/presentationml/2006/main">
+  <p:cSld>
+    <p:spTree>
+      <p:nvGrpSpPr>
+        <p:cNvPr id="1" name=""/>
+        <p:cNvGrpSpPr/>
+        <p:nvPr/>
+      </p:nvGrpSpPr>
+      <p:grpSpPr>
+        <a:xfrm>
+          <a:off x="0" y="0"/>
+          <a:ext cx="0" cy="0"/>
+          <a:chOff x="0" y="0"/>
+          <a:chExt cx="0" cy="0"/>
+        </a:xfrm>
+      </p:grpSpPr>
+      <p:sp>
+        <p:nvSpPr>
+          <p:cNvPr id="2" name="Title 1">
+            <a:extLst>
+              <a:ext uri="{FF2B5EF4-FFF2-40B4-BE49-F238E27FC236}">
+                <a16:creationId xmlns:a16="http://schemas.microsoft.com/office/drawing/2014/main" id="{EEEE8908-B397-8DBC-837B-DCE826B4F0F3}"/>
+              </a:ext>
+            </a:extLst>
+          </p:cNvPr>
+          <p:cNvSpPr>
+            <a:spLocks noGrp="1"/>
+          </p:cNvSpPr>
+          <p:nvPr>
+            <p:ph type="title"/>
+          </p:nvPr>
+        </p:nvSpPr>
+        <p:spPr/>
+        <p:txBody>
+          <a:bodyPr/>
+          <a:lstStyle/>
+          <a:p>
+            <a:endParaRPr lang="en-GB"/>
+          </a:p>
+        </p:txBody>
+      </p:sp>
+      <p:sp>
+        <p:nvSpPr>
+          <p:cNvPr id="3" name="Content Placeholder 2">
+            <a:extLst>
+              <a:ext uri="{FF2B5EF4-FFF2-40B4-BE49-F238E27FC236}">
+                <a16:creationId xmlns:a16="http://schemas.microsoft.com/office/drawing/2014/main" id="{427D7FB3-143B-9D59-B6BA-2AE0A1B02864}"/>
+              </a:ext>
+            </a:extLst>
+          </p:cNvPr>
+          <p:cNvSpPr>
+            <a:spLocks noGrp="1"/>
+          </p:cNvSpPr>
+          <p:nvPr>
+            <p:ph idx="1"/>
+          </p:nvPr>
+        </p:nvSpPr>
+        <p:spPr/>
+        <p:txBody>
+          <a:bodyPr/>
+          <a:lstStyle/>
+          <a:p>
+            <a:r>
+              <a:rPr lang="en-GB" dirty="0"/>
+              <a:t>Look at warcraft editor</a:t>
+            </a:r>
+          </a:p>
+          <a:p>
+            <a:r>
+              <a:rPr lang="en-GB" dirty="0" err="1"/>
+              <a:t>Obj</a:t>
+            </a:r>
+            <a:r>
+              <a:rPr lang="en-GB" dirty="0"/>
+              <a:t> and </a:t>
+            </a:r>
+            <a:r>
+              <a:rPr lang="en-GB" dirty="0" err="1"/>
+              <a:t>lua</a:t>
+            </a:r>
+            <a:r>
+              <a:rPr lang="en-GB" dirty="0"/>
+              <a:t> reloading button</a:t>
+            </a:r>
+          </a:p>
+          <a:p>
+            <a:r>
+              <a:rPr lang="en-GB" dirty="0"/>
+              <a:t>Ui</a:t>
+            </a:r>
+          </a:p>
+          <a:p>
+            <a:r>
+              <a:rPr lang="en-GB" dirty="0"/>
+              <a:t>Hit </a:t>
+            </a:r>
+            <a:r>
+              <a:rPr lang="en-GB" dirty="0" err="1"/>
+              <a:t>boxzes</a:t>
+            </a:r>
+            <a:endParaRPr lang="en-GB" dirty="0"/>
+          </a:p>
+          <a:p>
+            <a:r>
+              <a:rPr lang="en-GB" dirty="0"/>
+              <a:t>Check conditions for start and end</a:t>
+            </a:r>
+          </a:p>
+        </p:txBody>
+      </p:sp>
+    </p:spTree>
+    <p:extLst>
+      <p:ext uri="{BB962C8B-B14F-4D97-AF65-F5344CB8AC3E}">
+        <p14:creationId xmlns:p14="http://schemas.microsoft.com/office/powerpoint/2010/main" val="1581822917"/>
       </p:ext>
     </p:extLst>
   </p:cSld>

</xml_diff>

<commit_message>
object selector now working. reset button added. added more objects i have request and recived confirmation on use
</commit_message>
<xml_diff>
--- a/DevBlog.pptx
+++ b/DevBlog.pptx
@@ -7,7 +7,12 @@
   <p:sldIdLst>
     <p:sldId id="256" r:id="rId2"/>
     <p:sldId id="257" r:id="rId3"/>
-    <p:sldId id="258" r:id="rId4"/>
+    <p:sldId id="259" r:id="rId4"/>
+    <p:sldId id="260" r:id="rId5"/>
+    <p:sldId id="261" r:id="rId6"/>
+    <p:sldId id="262" r:id="rId7"/>
+    <p:sldId id="263" r:id="rId8"/>
+    <p:sldId id="258" r:id="rId9"/>
   </p:sldIdLst>
   <p:sldSz cx="12192000" cy="6858000"/>
   <p:notesSz cx="6858000" cy="9144000"/>
@@ -263,7 +268,7 @@
           <a:p>
             <a:fld id="{15572733-4D19-4DF4-9EBA-D8DF8FE67AD9}" type="datetimeFigureOut">
               <a:rPr lang="en-GB" smtClean="0"/>
-              <a:t>11/11/2024</a:t>
+              <a:t>24/11/2024</a:t>
             </a:fld>
             <a:endParaRPr lang="en-GB"/>
           </a:p>
@@ -463,7 +468,7 @@
           <a:p>
             <a:fld id="{15572733-4D19-4DF4-9EBA-D8DF8FE67AD9}" type="datetimeFigureOut">
               <a:rPr lang="en-GB" smtClean="0"/>
-              <a:t>11/11/2024</a:t>
+              <a:t>24/11/2024</a:t>
             </a:fld>
             <a:endParaRPr lang="en-GB"/>
           </a:p>
@@ -673,7 +678,7 @@
           <a:p>
             <a:fld id="{15572733-4D19-4DF4-9EBA-D8DF8FE67AD9}" type="datetimeFigureOut">
               <a:rPr lang="en-GB" smtClean="0"/>
-              <a:t>11/11/2024</a:t>
+              <a:t>24/11/2024</a:t>
             </a:fld>
             <a:endParaRPr lang="en-GB"/>
           </a:p>
@@ -873,7 +878,7 @@
           <a:p>
             <a:fld id="{15572733-4D19-4DF4-9EBA-D8DF8FE67AD9}" type="datetimeFigureOut">
               <a:rPr lang="en-GB" smtClean="0"/>
-              <a:t>11/11/2024</a:t>
+              <a:t>24/11/2024</a:t>
             </a:fld>
             <a:endParaRPr lang="en-GB"/>
           </a:p>
@@ -1149,7 +1154,7 @@
           <a:p>
             <a:fld id="{15572733-4D19-4DF4-9EBA-D8DF8FE67AD9}" type="datetimeFigureOut">
               <a:rPr lang="en-GB" smtClean="0"/>
-              <a:t>11/11/2024</a:t>
+              <a:t>24/11/2024</a:t>
             </a:fld>
             <a:endParaRPr lang="en-GB"/>
           </a:p>
@@ -1417,7 +1422,7 @@
           <a:p>
             <a:fld id="{15572733-4D19-4DF4-9EBA-D8DF8FE67AD9}" type="datetimeFigureOut">
               <a:rPr lang="en-GB" smtClean="0"/>
-              <a:t>11/11/2024</a:t>
+              <a:t>24/11/2024</a:t>
             </a:fld>
             <a:endParaRPr lang="en-GB"/>
           </a:p>
@@ -1832,7 +1837,7 @@
           <a:p>
             <a:fld id="{15572733-4D19-4DF4-9EBA-D8DF8FE67AD9}" type="datetimeFigureOut">
               <a:rPr lang="en-GB" smtClean="0"/>
-              <a:t>11/11/2024</a:t>
+              <a:t>24/11/2024</a:t>
             </a:fld>
             <a:endParaRPr lang="en-GB"/>
           </a:p>
@@ -1974,7 +1979,7 @@
           <a:p>
             <a:fld id="{15572733-4D19-4DF4-9EBA-D8DF8FE67AD9}" type="datetimeFigureOut">
               <a:rPr lang="en-GB" smtClean="0"/>
-              <a:t>11/11/2024</a:t>
+              <a:t>24/11/2024</a:t>
             </a:fld>
             <a:endParaRPr lang="en-GB"/>
           </a:p>
@@ -2087,7 +2092,7 @@
           <a:p>
             <a:fld id="{15572733-4D19-4DF4-9EBA-D8DF8FE67AD9}" type="datetimeFigureOut">
               <a:rPr lang="en-GB" smtClean="0"/>
-              <a:t>11/11/2024</a:t>
+              <a:t>24/11/2024</a:t>
             </a:fld>
             <a:endParaRPr lang="en-GB"/>
           </a:p>
@@ -2400,7 +2405,7 @@
           <a:p>
             <a:fld id="{15572733-4D19-4DF4-9EBA-D8DF8FE67AD9}" type="datetimeFigureOut">
               <a:rPr lang="en-GB" smtClean="0"/>
-              <a:t>11/11/2024</a:t>
+              <a:t>24/11/2024</a:t>
             </a:fld>
             <a:endParaRPr lang="en-GB"/>
           </a:p>
@@ -2689,7 +2694,7 @@
           <a:p>
             <a:fld id="{15572733-4D19-4DF4-9EBA-D8DF8FE67AD9}" type="datetimeFigureOut">
               <a:rPr lang="en-GB" smtClean="0"/>
-              <a:t>11/11/2024</a:t>
+              <a:t>24/11/2024</a:t>
             </a:fld>
             <a:endParaRPr lang="en-GB"/>
           </a:p>
@@ -2932,7 +2937,7 @@
           <a:p>
             <a:fld id="{15572733-4D19-4DF4-9EBA-D8DF8FE67AD9}" type="datetimeFigureOut">
               <a:rPr lang="en-GB" smtClean="0"/>
-              <a:t>11/11/2024</a:t>
+              <a:t>24/11/2024</a:t>
             </a:fld>
             <a:endParaRPr lang="en-GB"/>
           </a:p>
@@ -3612,6 +3617,662 @@
 </file>
 
 <file path=ppt/slides/slide3.xml><?xml version="1.0" encoding="utf-8"?>
+<p:sld xmlns:a="http://schemas.openxmlformats.org/drawingml/2006/main" xmlns:r="http://schemas.openxmlformats.org/officeDocument/2006/relationships" xmlns:p="http://schemas.openxmlformats.org/presentationml/2006/main">
+  <p:cSld>
+    <p:spTree>
+      <p:nvGrpSpPr>
+        <p:cNvPr id="1" name=""/>
+        <p:cNvGrpSpPr/>
+        <p:nvPr/>
+      </p:nvGrpSpPr>
+      <p:grpSpPr>
+        <a:xfrm>
+          <a:off x="0" y="0"/>
+          <a:ext cx="0" cy="0"/>
+          <a:chOff x="0" y="0"/>
+          <a:chExt cx="0" cy="0"/>
+        </a:xfrm>
+      </p:grpSpPr>
+      <p:sp>
+        <p:nvSpPr>
+          <p:cNvPr id="2" name="Title 1">
+            <a:extLst>
+              <a:ext uri="{FF2B5EF4-FFF2-40B4-BE49-F238E27FC236}">
+                <a16:creationId xmlns:a16="http://schemas.microsoft.com/office/drawing/2014/main" id="{3653B5CB-663B-4C67-B019-FAE29E0D0FB3}"/>
+              </a:ext>
+            </a:extLst>
+          </p:cNvPr>
+          <p:cNvSpPr>
+            <a:spLocks noGrp="1"/>
+          </p:cNvSpPr>
+          <p:nvPr>
+            <p:ph type="title"/>
+          </p:nvPr>
+        </p:nvSpPr>
+        <p:spPr/>
+        <p:txBody>
+          <a:bodyPr/>
+          <a:lstStyle/>
+          <a:p>
+            <a:r>
+              <a:rPr lang="en-GB" dirty="0"/>
+              <a:t>Sprint 2</a:t>
+            </a:r>
+            <a:endParaRPr lang="en-US" dirty="0"/>
+          </a:p>
+        </p:txBody>
+      </p:sp>
+      <p:sp>
+        <p:nvSpPr>
+          <p:cNvPr id="3" name="Content Placeholder 2">
+            <a:extLst>
+              <a:ext uri="{FF2B5EF4-FFF2-40B4-BE49-F238E27FC236}">
+                <a16:creationId xmlns:a16="http://schemas.microsoft.com/office/drawing/2014/main" id="{3CAA218E-7B3C-4ADC-9E56-D0ECCAA98D60}"/>
+              </a:ext>
+            </a:extLst>
+          </p:cNvPr>
+          <p:cNvSpPr>
+            <a:spLocks noGrp="1"/>
+          </p:cNvSpPr>
+          <p:nvPr>
+            <p:ph idx="1"/>
+          </p:nvPr>
+        </p:nvSpPr>
+        <p:spPr/>
+        <p:txBody>
+          <a:bodyPr>
+            <a:normAutofit/>
+          </a:bodyPr>
+          <a:lstStyle/>
+          <a:p>
+            <a:r>
+              <a:rPr lang="en-GB" dirty="0"/>
+              <a:t>Objects</a:t>
+            </a:r>
+          </a:p>
+          <a:p>
+            <a:pPr lvl="1"/>
+            <a:r>
+              <a:rPr lang="en-GB" dirty="0"/>
+              <a:t>Objects can now get reloaded with button click</a:t>
+            </a:r>
+          </a:p>
+          <a:p>
+            <a:pPr lvl="1"/>
+            <a:r>
+              <a:rPr lang="en-GB" dirty="0"/>
+              <a:t>Objects selection display now shows what the object looks like while selecting</a:t>
+            </a:r>
+          </a:p>
+          <a:p>
+            <a:pPr lvl="2"/>
+            <a:r>
+              <a:rPr lang="en-GB" dirty="0"/>
+              <a:t>Instead of drop down it is a scroll </a:t>
+            </a:r>
+          </a:p>
+          <a:p>
+            <a:pPr lvl="1"/>
+            <a:r>
+              <a:rPr lang="en-GB" dirty="0"/>
+              <a:t>Objects now have hitboxes/</a:t>
+            </a:r>
+            <a:r>
+              <a:rPr lang="en-GB" dirty="0" err="1"/>
+              <a:t>hitmeshs</a:t>
+            </a:r>
+            <a:r>
+              <a:rPr lang="en-GB" dirty="0"/>
+              <a:t> to facilitate mouse controls on objects</a:t>
+            </a:r>
+          </a:p>
+          <a:p>
+            <a:pPr lvl="1"/>
+            <a:r>
+              <a:rPr lang="en-GB" dirty="0"/>
+              <a:t>Objects can be clicked and held to be move</a:t>
+            </a:r>
+          </a:p>
+          <a:p>
+            <a:pPr lvl="2"/>
+            <a:r>
+              <a:rPr lang="en-GB" dirty="0"/>
+              <a:t>When hovering a shader is used to show which object is being </a:t>
+            </a:r>
+          </a:p>
+          <a:p>
+            <a:pPr lvl="2"/>
+            <a:r>
+              <a:rPr lang="en-GB" dirty="0"/>
+              <a:t>When being held and moved, the shader turns green</a:t>
+            </a:r>
+          </a:p>
+          <a:p>
+            <a:r>
+              <a:rPr lang="en-GB" dirty="0"/>
+              <a:t>More object have been added from the comp 2003 project and permission has been given</a:t>
+            </a:r>
+          </a:p>
+        </p:txBody>
+      </p:sp>
+    </p:spTree>
+    <p:extLst>
+      <p:ext uri="{BB962C8B-B14F-4D97-AF65-F5344CB8AC3E}">
+        <p14:creationId xmlns:p14="http://schemas.microsoft.com/office/powerpoint/2010/main" val="1221507815"/>
+      </p:ext>
+    </p:extLst>
+  </p:cSld>
+  <p:clrMapOvr>
+    <a:masterClrMapping/>
+  </p:clrMapOvr>
+</p:sld>
+</file>
+
+<file path=ppt/slides/slide4.xml><?xml version="1.0" encoding="utf-8"?>
+<p:sld xmlns:a="http://schemas.openxmlformats.org/drawingml/2006/main" xmlns:r="http://schemas.openxmlformats.org/officeDocument/2006/relationships" xmlns:p="http://schemas.openxmlformats.org/presentationml/2006/main">
+  <p:cSld>
+    <p:spTree>
+      <p:nvGrpSpPr>
+        <p:cNvPr id="1" name=""/>
+        <p:cNvGrpSpPr/>
+        <p:nvPr/>
+      </p:nvGrpSpPr>
+      <p:grpSpPr>
+        <a:xfrm>
+          <a:off x="0" y="0"/>
+          <a:ext cx="0" cy="0"/>
+          <a:chOff x="0" y="0"/>
+          <a:chExt cx="0" cy="0"/>
+        </a:xfrm>
+      </p:grpSpPr>
+      <p:sp>
+        <p:nvSpPr>
+          <p:cNvPr id="2" name="Title 1">
+            <a:extLst>
+              <a:ext uri="{FF2B5EF4-FFF2-40B4-BE49-F238E27FC236}">
+                <a16:creationId xmlns:a16="http://schemas.microsoft.com/office/drawing/2014/main" id="{41582634-8231-45C3-9E52-DAE1B4BCA0FC}"/>
+              </a:ext>
+            </a:extLst>
+          </p:cNvPr>
+          <p:cNvSpPr>
+            <a:spLocks noGrp="1"/>
+          </p:cNvSpPr>
+          <p:nvPr>
+            <p:ph type="title"/>
+          </p:nvPr>
+        </p:nvSpPr>
+        <p:spPr/>
+        <p:txBody>
+          <a:bodyPr/>
+          <a:lstStyle/>
+          <a:p>
+            <a:endParaRPr lang="en-US"/>
+          </a:p>
+        </p:txBody>
+      </p:sp>
+      <p:pic>
+        <p:nvPicPr>
+          <p:cNvPr id="4" name="Content Placeholder 3">
+            <a:extLst>
+              <a:ext uri="{FF2B5EF4-FFF2-40B4-BE49-F238E27FC236}">
+                <a16:creationId xmlns:a16="http://schemas.microsoft.com/office/drawing/2014/main" id="{7D27BC45-94A2-4705-B53A-76FB6F02509B}"/>
+              </a:ext>
+            </a:extLst>
+          </p:cNvPr>
+          <p:cNvPicPr>
+            <a:picLocks noGrp="1" noChangeAspect="1"/>
+          </p:cNvPicPr>
+          <p:nvPr>
+            <p:ph idx="1"/>
+          </p:nvPr>
+        </p:nvPicPr>
+        <p:blipFill>
+          <a:blip r:embed="rId2"/>
+          <a:stretch>
+            <a:fillRect/>
+          </a:stretch>
+        </p:blipFill>
+        <p:spPr>
+          <a:xfrm>
+            <a:off x="838200" y="1816472"/>
+            <a:ext cx="3248025" cy="4257675"/>
+          </a:xfrm>
+          <a:prstGeom prst="rect">
+            <a:avLst/>
+          </a:prstGeom>
+        </p:spPr>
+      </p:pic>
+      <p:pic>
+        <p:nvPicPr>
+          <p:cNvPr id="5" name="Picture 4">
+            <a:extLst>
+              <a:ext uri="{FF2B5EF4-FFF2-40B4-BE49-F238E27FC236}">
+                <a16:creationId xmlns:a16="http://schemas.microsoft.com/office/drawing/2014/main" id="{DE457902-A30D-4A76-8F01-7060F4BD9281}"/>
+              </a:ext>
+            </a:extLst>
+          </p:cNvPr>
+          <p:cNvPicPr>
+            <a:picLocks noChangeAspect="1"/>
+          </p:cNvPicPr>
+          <p:nvPr/>
+        </p:nvPicPr>
+        <p:blipFill>
+          <a:blip r:embed="rId3"/>
+          <a:stretch>
+            <a:fillRect/>
+          </a:stretch>
+        </p:blipFill>
+        <p:spPr>
+          <a:xfrm>
+            <a:off x="4452937" y="1845046"/>
+            <a:ext cx="3286125" cy="4200525"/>
+          </a:xfrm>
+          <a:prstGeom prst="rect">
+            <a:avLst/>
+          </a:prstGeom>
+        </p:spPr>
+      </p:pic>
+      <p:pic>
+        <p:nvPicPr>
+          <p:cNvPr id="6" name="Picture 5">
+            <a:extLst>
+              <a:ext uri="{FF2B5EF4-FFF2-40B4-BE49-F238E27FC236}">
+                <a16:creationId xmlns:a16="http://schemas.microsoft.com/office/drawing/2014/main" id="{8AF2608F-CE6E-4D4D-87EF-D946EA3B5049}"/>
+              </a:ext>
+            </a:extLst>
+          </p:cNvPr>
+          <p:cNvPicPr>
+            <a:picLocks noChangeAspect="1"/>
+          </p:cNvPicPr>
+          <p:nvPr/>
+        </p:nvPicPr>
+        <p:blipFill>
+          <a:blip r:embed="rId4"/>
+          <a:stretch>
+            <a:fillRect/>
+          </a:stretch>
+        </p:blipFill>
+        <p:spPr>
+          <a:xfrm>
+            <a:off x="8162925" y="1954583"/>
+            <a:ext cx="3190875" cy="3981450"/>
+          </a:xfrm>
+          <a:prstGeom prst="rect">
+            <a:avLst/>
+          </a:prstGeom>
+        </p:spPr>
+      </p:pic>
+    </p:spTree>
+    <p:extLst>
+      <p:ext uri="{BB962C8B-B14F-4D97-AF65-F5344CB8AC3E}">
+        <p14:creationId xmlns:p14="http://schemas.microsoft.com/office/powerpoint/2010/main" val="283284617"/>
+      </p:ext>
+    </p:extLst>
+  </p:cSld>
+  <p:clrMapOvr>
+    <a:masterClrMapping/>
+  </p:clrMapOvr>
+</p:sld>
+</file>
+
+<file path=ppt/slides/slide5.xml><?xml version="1.0" encoding="utf-8"?>
+<p:sld xmlns:a="http://schemas.openxmlformats.org/drawingml/2006/main" xmlns:r="http://schemas.openxmlformats.org/officeDocument/2006/relationships" xmlns:p="http://schemas.openxmlformats.org/presentationml/2006/main">
+  <p:cSld>
+    <p:spTree>
+      <p:nvGrpSpPr>
+        <p:cNvPr id="1" name=""/>
+        <p:cNvGrpSpPr/>
+        <p:nvPr/>
+      </p:nvGrpSpPr>
+      <p:grpSpPr>
+        <a:xfrm>
+          <a:off x="0" y="0"/>
+          <a:ext cx="0" cy="0"/>
+          <a:chOff x="0" y="0"/>
+          <a:chExt cx="0" cy="0"/>
+        </a:xfrm>
+      </p:grpSpPr>
+      <p:sp>
+        <p:nvSpPr>
+          <p:cNvPr id="2" name="Title 1">
+            <a:extLst>
+              <a:ext uri="{FF2B5EF4-FFF2-40B4-BE49-F238E27FC236}">
+                <a16:creationId xmlns:a16="http://schemas.microsoft.com/office/drawing/2014/main" id="{6E392595-9AC4-4820-B36D-DB757B87E1C3}"/>
+              </a:ext>
+            </a:extLst>
+          </p:cNvPr>
+          <p:cNvSpPr>
+            <a:spLocks noGrp="1"/>
+          </p:cNvSpPr>
+          <p:nvPr>
+            <p:ph type="title"/>
+          </p:nvPr>
+        </p:nvSpPr>
+        <p:spPr/>
+        <p:txBody>
+          <a:bodyPr/>
+          <a:lstStyle/>
+          <a:p>
+            <a:endParaRPr lang="en-US"/>
+          </a:p>
+        </p:txBody>
+      </p:sp>
+      <p:pic>
+        <p:nvPicPr>
+          <p:cNvPr id="4" name="Content Placeholder 3">
+            <a:extLst>
+              <a:ext uri="{FF2B5EF4-FFF2-40B4-BE49-F238E27FC236}">
+                <a16:creationId xmlns:a16="http://schemas.microsoft.com/office/drawing/2014/main" id="{5488A9C9-C47A-4334-AA97-14D8B24BA894}"/>
+              </a:ext>
+            </a:extLst>
+          </p:cNvPr>
+          <p:cNvPicPr>
+            <a:picLocks noGrp="1" noChangeAspect="1"/>
+          </p:cNvPicPr>
+          <p:nvPr>
+            <p:ph idx="1"/>
+          </p:nvPr>
+        </p:nvPicPr>
+        <p:blipFill>
+          <a:blip r:embed="rId2"/>
+          <a:stretch>
+            <a:fillRect/>
+          </a:stretch>
+        </p:blipFill>
+        <p:spPr>
+          <a:xfrm>
+            <a:off x="838200" y="1054143"/>
+            <a:ext cx="10515600" cy="2715093"/>
+          </a:xfrm>
+          <a:prstGeom prst="rect">
+            <a:avLst/>
+          </a:prstGeom>
+        </p:spPr>
+      </p:pic>
+      <p:pic>
+        <p:nvPicPr>
+          <p:cNvPr id="5" name="Picture 4">
+            <a:extLst>
+              <a:ext uri="{FF2B5EF4-FFF2-40B4-BE49-F238E27FC236}">
+                <a16:creationId xmlns:a16="http://schemas.microsoft.com/office/drawing/2014/main" id="{CDAC9DA0-A8E7-4C93-9888-054C7ACBB865}"/>
+              </a:ext>
+            </a:extLst>
+          </p:cNvPr>
+          <p:cNvPicPr>
+            <a:picLocks noChangeAspect="1"/>
+          </p:cNvPicPr>
+          <p:nvPr/>
+        </p:nvPicPr>
+        <p:blipFill>
+          <a:blip r:embed="rId3"/>
+          <a:stretch>
+            <a:fillRect/>
+          </a:stretch>
+        </p:blipFill>
+        <p:spPr>
+          <a:xfrm>
+            <a:off x="1029478" y="4206751"/>
+            <a:ext cx="10133044" cy="2651249"/>
+          </a:xfrm>
+          <a:prstGeom prst="rect">
+            <a:avLst/>
+          </a:prstGeom>
+        </p:spPr>
+      </p:pic>
+    </p:spTree>
+    <p:extLst>
+      <p:ext uri="{BB962C8B-B14F-4D97-AF65-F5344CB8AC3E}">
+        <p14:creationId xmlns:p14="http://schemas.microsoft.com/office/powerpoint/2010/main" val="141209038"/>
+      </p:ext>
+    </p:extLst>
+  </p:cSld>
+  <p:clrMapOvr>
+    <a:masterClrMapping/>
+  </p:clrMapOvr>
+</p:sld>
+</file>
+
+<file path=ppt/slides/slide6.xml><?xml version="1.0" encoding="utf-8"?>
+<p:sld xmlns:a="http://schemas.openxmlformats.org/drawingml/2006/main" xmlns:r="http://schemas.openxmlformats.org/officeDocument/2006/relationships" xmlns:p="http://schemas.openxmlformats.org/presentationml/2006/main">
+  <p:cSld>
+    <p:spTree>
+      <p:nvGrpSpPr>
+        <p:cNvPr id="1" name=""/>
+        <p:cNvGrpSpPr/>
+        <p:nvPr/>
+      </p:nvGrpSpPr>
+      <p:grpSpPr>
+        <a:xfrm>
+          <a:off x="0" y="0"/>
+          <a:ext cx="0" cy="0"/>
+          <a:chOff x="0" y="0"/>
+          <a:chExt cx="0" cy="0"/>
+        </a:xfrm>
+      </p:grpSpPr>
+      <p:sp>
+        <p:nvSpPr>
+          <p:cNvPr id="2" name="Title 1">
+            <a:extLst>
+              <a:ext uri="{FF2B5EF4-FFF2-40B4-BE49-F238E27FC236}">
+                <a16:creationId xmlns:a16="http://schemas.microsoft.com/office/drawing/2014/main" id="{6AC4D78F-AE0A-4651-A494-9AD576BA40D3}"/>
+              </a:ext>
+            </a:extLst>
+          </p:cNvPr>
+          <p:cNvSpPr>
+            <a:spLocks noGrp="1"/>
+          </p:cNvSpPr>
+          <p:nvPr>
+            <p:ph type="title"/>
+          </p:nvPr>
+        </p:nvSpPr>
+        <p:spPr>
+          <a:xfrm>
+            <a:off x="1778259" y="377566"/>
+            <a:ext cx="8635482" cy="1084230"/>
+          </a:xfrm>
+        </p:spPr>
+        <p:txBody>
+          <a:bodyPr>
+            <a:normAutofit fontScale="90000"/>
+          </a:bodyPr>
+          <a:lstStyle/>
+          <a:p>
+            <a:pPr algn="ctr"/>
+            <a:r>
+              <a:rPr lang="en-GB" dirty="0"/>
+              <a:t>Approval form shav to allow me to make a </a:t>
+            </a:r>
+            <a:r>
+              <a:rPr lang="en-GB" dirty="0" err="1"/>
+              <a:t>modding</a:t>
+            </a:r>
+            <a:r>
+              <a:rPr lang="en-GB" dirty="0"/>
+              <a:t> tool for Co-Operation</a:t>
+            </a:r>
+            <a:endParaRPr lang="en-US" dirty="0"/>
+          </a:p>
+        </p:txBody>
+      </p:sp>
+      <p:pic>
+        <p:nvPicPr>
+          <p:cNvPr id="5" name="Content Placeholder 4">
+            <a:extLst>
+              <a:ext uri="{FF2B5EF4-FFF2-40B4-BE49-F238E27FC236}">
+                <a16:creationId xmlns:a16="http://schemas.microsoft.com/office/drawing/2014/main" id="{D8498428-3305-4896-B09E-0A71BD30D8F0}"/>
+              </a:ext>
+            </a:extLst>
+          </p:cNvPr>
+          <p:cNvPicPr>
+            <a:picLocks noGrp="1" noChangeAspect="1"/>
+          </p:cNvPicPr>
+          <p:nvPr>
+            <p:ph idx="1"/>
+          </p:nvPr>
+        </p:nvPicPr>
+        <p:blipFill>
+          <a:blip r:embed="rId2">
+            <a:extLst>
+              <a:ext uri="{28A0092B-C50C-407E-A947-70E740481C1C}">
+                <a14:useLocalDpi xmlns:a14="http://schemas.microsoft.com/office/drawing/2010/main" val="0"/>
+              </a:ext>
+            </a:extLst>
+          </a:blip>
+          <a:stretch>
+            <a:fillRect/>
+          </a:stretch>
+        </p:blipFill>
+        <p:spPr>
+          <a:xfrm>
+            <a:off x="838200" y="2339229"/>
+            <a:ext cx="10515600" cy="2617040"/>
+          </a:xfrm>
+        </p:spPr>
+      </p:pic>
+    </p:spTree>
+    <p:extLst>
+      <p:ext uri="{BB962C8B-B14F-4D97-AF65-F5344CB8AC3E}">
+        <p14:creationId xmlns:p14="http://schemas.microsoft.com/office/powerpoint/2010/main" val="1289522645"/>
+      </p:ext>
+    </p:extLst>
+  </p:cSld>
+  <p:clrMapOvr>
+    <a:masterClrMapping/>
+  </p:clrMapOvr>
+</p:sld>
+</file>
+
+<file path=ppt/slides/slide7.xml><?xml version="1.0" encoding="utf-8"?>
+<p:sld xmlns:a="http://schemas.openxmlformats.org/drawingml/2006/main" xmlns:r="http://schemas.openxmlformats.org/officeDocument/2006/relationships" xmlns:p="http://schemas.openxmlformats.org/presentationml/2006/main">
+  <p:cSld>
+    <p:spTree>
+      <p:nvGrpSpPr>
+        <p:cNvPr id="1" name=""/>
+        <p:cNvGrpSpPr/>
+        <p:nvPr/>
+      </p:nvGrpSpPr>
+      <p:grpSpPr>
+        <a:xfrm>
+          <a:off x="0" y="0"/>
+          <a:ext cx="0" cy="0"/>
+          <a:chOff x="0" y="0"/>
+          <a:chExt cx="0" cy="0"/>
+        </a:xfrm>
+      </p:grpSpPr>
+      <p:sp>
+        <p:nvSpPr>
+          <p:cNvPr id="2" name="Title 1">
+            <a:extLst>
+              <a:ext uri="{FF2B5EF4-FFF2-40B4-BE49-F238E27FC236}">
+                <a16:creationId xmlns:a16="http://schemas.microsoft.com/office/drawing/2014/main" id="{D96A4624-9870-4F81-9BA5-E057E65F2101}"/>
+              </a:ext>
+            </a:extLst>
+          </p:cNvPr>
+          <p:cNvSpPr>
+            <a:spLocks noGrp="1"/>
+          </p:cNvSpPr>
+          <p:nvPr>
+            <p:ph type="title"/>
+          </p:nvPr>
+        </p:nvSpPr>
+        <p:spPr>
+          <a:xfrm>
+            <a:off x="838200" y="365125"/>
+            <a:ext cx="8249816" cy="1325563"/>
+          </a:xfrm>
+        </p:spPr>
+        <p:txBody>
+          <a:bodyPr>
+            <a:normAutofit fontScale="90000"/>
+          </a:bodyPr>
+          <a:lstStyle/>
+          <a:p>
+            <a:r>
+              <a:rPr lang="en-GB" dirty="0"/>
+              <a:t>Approval of team members allowing me to use the models I’ve created</a:t>
+            </a:r>
+            <a:endParaRPr lang="en-US" dirty="0"/>
+          </a:p>
+        </p:txBody>
+      </p:sp>
+      <p:pic>
+        <p:nvPicPr>
+          <p:cNvPr id="5" name="Content Placeholder 4">
+            <a:extLst>
+              <a:ext uri="{FF2B5EF4-FFF2-40B4-BE49-F238E27FC236}">
+                <a16:creationId xmlns:a16="http://schemas.microsoft.com/office/drawing/2014/main" id="{E838655B-D7B9-4E18-9EB5-00511D8B0057}"/>
+              </a:ext>
+            </a:extLst>
+          </p:cNvPr>
+          <p:cNvPicPr>
+            <a:picLocks noGrp="1" noChangeAspect="1"/>
+          </p:cNvPicPr>
+          <p:nvPr>
+            <p:ph idx="1"/>
+          </p:nvPr>
+        </p:nvPicPr>
+        <p:blipFill rotWithShape="1">
+          <a:blip r:embed="rId2">
+            <a:extLst>
+              <a:ext uri="{28A0092B-C50C-407E-A947-70E740481C1C}">
+                <a14:useLocalDpi xmlns:a14="http://schemas.microsoft.com/office/drawing/2010/main" val="0"/>
+              </a:ext>
+            </a:extLst>
+          </a:blip>
+          <a:srcRect t="3933" b="5863"/>
+          <a:stretch/>
+        </p:blipFill>
+        <p:spPr>
+          <a:xfrm>
+            <a:off x="9610157" y="128749"/>
+            <a:ext cx="2116867" cy="3925078"/>
+          </a:xfrm>
+        </p:spPr>
+      </p:pic>
+      <p:pic>
+        <p:nvPicPr>
+          <p:cNvPr id="6" name="Picture 5">
+            <a:extLst>
+              <a:ext uri="{FF2B5EF4-FFF2-40B4-BE49-F238E27FC236}">
+                <a16:creationId xmlns:a16="http://schemas.microsoft.com/office/drawing/2014/main" id="{652D8F0A-68D9-44B1-8D76-208C2A3B628D}"/>
+              </a:ext>
+            </a:extLst>
+          </p:cNvPr>
+          <p:cNvPicPr>
+            <a:picLocks noChangeAspect="1"/>
+          </p:cNvPicPr>
+          <p:nvPr/>
+        </p:nvPicPr>
+        <p:blipFill>
+          <a:blip r:embed="rId3"/>
+          <a:stretch>
+            <a:fillRect/>
+          </a:stretch>
+        </p:blipFill>
+        <p:spPr>
+          <a:xfrm>
+            <a:off x="557016" y="3560342"/>
+            <a:ext cx="9572625" cy="1352550"/>
+          </a:xfrm>
+          <a:prstGeom prst="rect">
+            <a:avLst/>
+          </a:prstGeom>
+        </p:spPr>
+      </p:pic>
+    </p:spTree>
+    <p:extLst>
+      <p:ext uri="{BB962C8B-B14F-4D97-AF65-F5344CB8AC3E}">
+        <p14:creationId xmlns:p14="http://schemas.microsoft.com/office/powerpoint/2010/main" val="998159024"/>
+      </p:ext>
+    </p:extLst>
+  </p:cSld>
+  <p:clrMapOvr>
+    <a:masterClrMapping/>
+  </p:clrMapOvr>
+</p:sld>
+</file>
+
+<file path=ppt/slides/slide8.xml><?xml version="1.0" encoding="utf-8"?>
 <p:sld xmlns:a="http://schemas.openxmlformats.org/drawingml/2006/main" xmlns:r="http://schemas.openxmlformats.org/officeDocument/2006/relationships" xmlns:p="http://schemas.openxmlformats.org/presentationml/2006/main">
   <p:cSld>
     <p:spTree>

</xml_diff>